<commit_message>
Updates to Jan 16 slides.
</commit_message>
<xml_diff>
--- a/Slides/011619-MC-GFS-MapReduce.pptx
+++ b/Slides/011619-MC-GFS-MapReduce.pptx
@@ -248,7 +248,7 @@
           <a:p>
             <a:fld id="{7B04D10A-81D1-8748-8404-C44E2799F913}" type="datetimeFigureOut">
               <a:rPr lang="en-US" smtClean="0"/>
-              <a:t>1/15/19</a:t>
+              <a:t>1/16/19</a:t>
             </a:fld>
             <a:endParaRPr lang="en-US"/>
           </a:p>
@@ -12574,6 +12574,35 @@
             <a:r>
               <a:rPr lang="en-US" dirty="0"/>
               <a:t>Presenters and reviewers must read all papers listed</a:t>
+            </a:r>
+          </a:p>
+          <a:p>
+            <a:endParaRPr lang="en-US" dirty="0"/>
+          </a:p>
+          <a:p>
+            <a:r>
+              <a:rPr lang="en-US" dirty="0">
+                <a:solidFill>
+                  <a:srgbClr val="FF0000"/>
+                </a:solidFill>
+              </a:rPr>
+              <a:t>Pop QUIZ: https://</a:t>
+            </a:r>
+            <a:r>
+              <a:rPr lang="en-US" dirty="0" err="1">
+                <a:solidFill>
+                  <a:srgbClr val="FF0000"/>
+                </a:solidFill>
+              </a:rPr>
+              <a:t>goo.gl</a:t>
+            </a:r>
+            <a:r>
+              <a:rPr lang="en-US" dirty="0">
+                <a:solidFill>
+                  <a:srgbClr val="FF0000"/>
+                </a:solidFill>
+              </a:rPr>
+              <a:t>/forms/3obXL70Y78syHMSQ2</a:t>
             </a:r>
           </a:p>
         </p:txBody>

</xml_diff>